<commit_message>
making notebooks interactive, working on ppt
</commit_message>
<xml_diff>
--- a/Week_2/TIdy_data.pptx
+++ b/Week_2/TIdy_data.pptx
@@ -12,9 +12,9 @@
     <p:sldId id="261" r:id="rId6"/>
     <p:sldId id="262" r:id="rId7"/>
     <p:sldId id="266" r:id="rId8"/>
-    <p:sldId id="263" r:id="rId9"/>
-    <p:sldId id="265" r:id="rId10"/>
-    <p:sldId id="264" r:id="rId11"/>
+    <p:sldId id="264" r:id="rId9"/>
+    <p:sldId id="263" r:id="rId10"/>
+    <p:sldId id="265" r:id="rId11"/>
     <p:sldId id="267" r:id="rId12"/>
   </p:sldIdLst>
   <p:sldSz cx="12192000" cy="6858000"/>
@@ -127,7 +127,7 @@
   <pc:docChgLst>
     <pc:chgData name="Catherine Kidner" userId="05772faa-c547-42bd-a4f8-01ff9d39ffcc" providerId="ADAL" clId="{A45D7CD4-5E0E-6845-96C9-0DFA878C3CDA}"/>
     <pc:docChg chg="undo custSel addSld delSld modSld sldOrd">
-      <pc:chgData name="Catherine Kidner" userId="05772faa-c547-42bd-a4f8-01ff9d39ffcc" providerId="ADAL" clId="{A45D7CD4-5E0E-6845-96C9-0DFA878C3CDA}" dt="2023-05-23T12:50:41.787" v="1241" actId="2696"/>
+      <pc:chgData name="Catherine Kidner" userId="05772faa-c547-42bd-a4f8-01ff9d39ffcc" providerId="ADAL" clId="{A45D7CD4-5E0E-6845-96C9-0DFA878C3CDA}" dt="2023-06-05T14:05:24.995" v="1448" actId="20577"/>
       <pc:docMkLst>
         <pc:docMk/>
       </pc:docMkLst>
@@ -421,7 +421,7 @@
         </pc:spChg>
       </pc:sldChg>
       <pc:sldChg chg="addSp delSp modSp new mod">
-        <pc:chgData name="Catherine Kidner" userId="05772faa-c547-42bd-a4f8-01ff9d39ffcc" providerId="ADAL" clId="{A45D7CD4-5E0E-6845-96C9-0DFA878C3CDA}" dt="2023-05-19T15:49:52.152" v="1002" actId="207"/>
+        <pc:chgData name="Catherine Kidner" userId="05772faa-c547-42bd-a4f8-01ff9d39ffcc" providerId="ADAL" clId="{A45D7CD4-5E0E-6845-96C9-0DFA878C3CDA}" dt="2023-06-05T14:05:12.653" v="1446" actId="20577"/>
         <pc:sldMkLst>
           <pc:docMk/>
           <pc:sldMk cId="4172342904" sldId="263"/>
@@ -443,6 +443,14 @@
           </ac:spMkLst>
         </pc:spChg>
         <pc:spChg chg="add mod">
+          <ac:chgData name="Catherine Kidner" userId="05772faa-c547-42bd-a4f8-01ff9d39ffcc" providerId="ADAL" clId="{A45D7CD4-5E0E-6845-96C9-0DFA878C3CDA}" dt="2023-06-01T12:34:57.820" v="1311" actId="207"/>
+          <ac:spMkLst>
+            <pc:docMk/>
+            <pc:sldMk cId="4172342904" sldId="263"/>
+            <ac:spMk id="3" creationId="{79BD258C-B20E-F39D-3B3F-B4CD12038FCB}"/>
+          </ac:spMkLst>
+        </pc:spChg>
+        <pc:spChg chg="add mod">
           <ac:chgData name="Catherine Kidner" userId="05772faa-c547-42bd-a4f8-01ff9d39ffcc" providerId="ADAL" clId="{A45D7CD4-5E0E-6845-96C9-0DFA878C3CDA}" dt="2023-05-19T15:39:03.080" v="850" actId="403"/>
           <ac:spMkLst>
             <pc:docMk/>
@@ -459,7 +467,7 @@
           </ac:spMkLst>
         </pc:spChg>
         <pc:spChg chg="add mod">
-          <ac:chgData name="Catherine Kidner" userId="05772faa-c547-42bd-a4f8-01ff9d39ffcc" providerId="ADAL" clId="{A45D7CD4-5E0E-6845-96C9-0DFA878C3CDA}" dt="2023-05-19T15:49:52.152" v="1002" actId="207"/>
+          <ac:chgData name="Catherine Kidner" userId="05772faa-c547-42bd-a4f8-01ff9d39ffcc" providerId="ADAL" clId="{A45D7CD4-5E0E-6845-96C9-0DFA878C3CDA}" dt="2023-06-05T14:05:12.653" v="1446" actId="20577"/>
           <ac:spMkLst>
             <pc:docMk/>
             <pc:sldMk cId="4172342904" sldId="263"/>
@@ -475,8 +483,8 @@
           </ac:picMkLst>
         </pc:picChg>
       </pc:sldChg>
-      <pc:sldChg chg="addSp delSp modSp new mod">
-        <pc:chgData name="Catherine Kidner" userId="05772faa-c547-42bd-a4f8-01ff9d39ffcc" providerId="ADAL" clId="{A45D7CD4-5E0E-6845-96C9-0DFA878C3CDA}" dt="2023-05-19T15:55:27.912" v="1028" actId="207"/>
+      <pc:sldChg chg="addSp delSp modSp new mod ord">
+        <pc:chgData name="Catherine Kidner" userId="05772faa-c547-42bd-a4f8-01ff9d39ffcc" providerId="ADAL" clId="{A45D7CD4-5E0E-6845-96C9-0DFA878C3CDA}" dt="2023-06-01T13:07:58.288" v="1399" actId="20578"/>
         <pc:sldMkLst>
           <pc:docMk/>
           <pc:sldMk cId="898206973" sldId="264"/>
@@ -523,7 +531,7 @@
         </pc:picChg>
       </pc:sldChg>
       <pc:sldChg chg="addSp delSp modSp new mod">
-        <pc:chgData name="Catherine Kidner" userId="05772faa-c547-42bd-a4f8-01ff9d39ffcc" providerId="ADAL" clId="{A45D7CD4-5E0E-6845-96C9-0DFA878C3CDA}" dt="2023-05-19T15:50:23.165" v="1015" actId="207"/>
+        <pc:chgData name="Catherine Kidner" userId="05772faa-c547-42bd-a4f8-01ff9d39ffcc" providerId="ADAL" clId="{A45D7CD4-5E0E-6845-96C9-0DFA878C3CDA}" dt="2023-06-05T14:05:24.995" v="1448" actId="20577"/>
         <pc:sldMkLst>
           <pc:docMk/>
           <pc:sldMk cId="261170781" sldId="265"/>
@@ -536,6 +544,14 @@
             <ac:spMk id="2" creationId="{FC6839B1-E3FA-72EC-987B-E8B041A9A479}"/>
           </ac:spMkLst>
         </pc:spChg>
+        <pc:spChg chg="add mod">
+          <ac:chgData name="Catherine Kidner" userId="05772faa-c547-42bd-a4f8-01ff9d39ffcc" providerId="ADAL" clId="{A45D7CD4-5E0E-6845-96C9-0DFA878C3CDA}" dt="2023-06-05T14:04:53.617" v="1432" actId="20577"/>
+          <ac:spMkLst>
+            <pc:docMk/>
+            <pc:sldMk cId="261170781" sldId="265"/>
+            <ac:spMk id="3" creationId="{83A77B87-7DC5-3175-2ABA-C484B5DB88A3}"/>
+          </ac:spMkLst>
+        </pc:spChg>
         <pc:spChg chg="del">
           <ac:chgData name="Catherine Kidner" userId="05772faa-c547-42bd-a4f8-01ff9d39ffcc" providerId="ADAL" clId="{A45D7CD4-5E0E-6845-96C9-0DFA878C3CDA}" dt="2023-05-19T15:42:53.224" v="877" actId="478"/>
           <ac:spMkLst>
@@ -545,7 +561,7 @@
           </ac:spMkLst>
         </pc:spChg>
         <pc:spChg chg="add mod">
-          <ac:chgData name="Catherine Kidner" userId="05772faa-c547-42bd-a4f8-01ff9d39ffcc" providerId="ADAL" clId="{A45D7CD4-5E0E-6845-96C9-0DFA878C3CDA}" dt="2023-05-19T15:43:38.518" v="917" actId="404"/>
+          <ac:chgData name="Catherine Kidner" userId="05772faa-c547-42bd-a4f8-01ff9d39ffcc" providerId="ADAL" clId="{A45D7CD4-5E0E-6845-96C9-0DFA878C3CDA}" dt="2023-06-05T14:05:24.995" v="1448" actId="20577"/>
           <ac:spMkLst>
             <pc:docMk/>
             <pc:sldMk cId="261170781" sldId="265"/>
@@ -553,7 +569,7 @@
           </ac:spMkLst>
         </pc:spChg>
         <pc:spChg chg="add mod">
-          <ac:chgData name="Catherine Kidner" userId="05772faa-c547-42bd-a4f8-01ff9d39ffcc" providerId="ADAL" clId="{A45D7CD4-5E0E-6845-96C9-0DFA878C3CDA}" dt="2023-05-19T15:50:23.165" v="1015" actId="207"/>
+          <ac:chgData name="Catherine Kidner" userId="05772faa-c547-42bd-a4f8-01ff9d39ffcc" providerId="ADAL" clId="{A45D7CD4-5E0E-6845-96C9-0DFA878C3CDA}" dt="2023-06-05T14:05:06.739" v="1444" actId="20577"/>
           <ac:spMkLst>
             <pc:docMk/>
             <pc:sldMk cId="261170781" sldId="265"/>
@@ -570,7 +586,7 @@
         </pc:picChg>
       </pc:sldChg>
       <pc:sldChg chg="addSp delSp modSp new mod">
-        <pc:chgData name="Catherine Kidner" userId="05772faa-c547-42bd-a4f8-01ff9d39ffcc" providerId="ADAL" clId="{A45D7CD4-5E0E-6845-96C9-0DFA878C3CDA}" dt="2023-05-23T10:34:46.119" v="1121" actId="1076"/>
+        <pc:chgData name="Catherine Kidner" userId="05772faa-c547-42bd-a4f8-01ff9d39ffcc" providerId="ADAL" clId="{A45D7CD4-5E0E-6845-96C9-0DFA878C3CDA}" dt="2023-06-01T14:26:25.204" v="1426" actId="403"/>
         <pc:sldMkLst>
           <pc:docMk/>
           <pc:sldMk cId="2424707560" sldId="266"/>
@@ -592,7 +608,7 @@
           </ac:spMkLst>
         </pc:spChg>
         <pc:spChg chg="add mod">
-          <ac:chgData name="Catherine Kidner" userId="05772faa-c547-42bd-a4f8-01ff9d39ffcc" providerId="ADAL" clId="{A45D7CD4-5E0E-6845-96C9-0DFA878C3CDA}" dt="2023-05-23T10:34:43.869" v="1120" actId="1076"/>
+          <ac:chgData name="Catherine Kidner" userId="05772faa-c547-42bd-a4f8-01ff9d39ffcc" providerId="ADAL" clId="{A45D7CD4-5E0E-6845-96C9-0DFA878C3CDA}" dt="2023-06-01T14:26:21.319" v="1424" actId="1076"/>
           <ac:spMkLst>
             <pc:docMk/>
             <pc:sldMk cId="2424707560" sldId="266"/>
@@ -600,7 +616,7 @@
           </ac:spMkLst>
         </pc:spChg>
         <pc:spChg chg="add mod">
-          <ac:chgData name="Catherine Kidner" userId="05772faa-c547-42bd-a4f8-01ff9d39ffcc" providerId="ADAL" clId="{A45D7CD4-5E0E-6845-96C9-0DFA878C3CDA}" dt="2023-05-19T15:45:38.098" v="986" actId="403"/>
+          <ac:chgData name="Catherine Kidner" userId="05772faa-c547-42bd-a4f8-01ff9d39ffcc" providerId="ADAL" clId="{A45D7CD4-5E0E-6845-96C9-0DFA878C3CDA}" dt="2023-06-01T14:26:18.848" v="1423" actId="1076"/>
           <ac:spMkLst>
             <pc:docMk/>
             <pc:sldMk cId="2424707560" sldId="266"/>
@@ -608,7 +624,7 @@
           </ac:spMkLst>
         </pc:spChg>
         <pc:spChg chg="add mod">
-          <ac:chgData name="Catherine Kidner" userId="05772faa-c547-42bd-a4f8-01ff9d39ffcc" providerId="ADAL" clId="{A45D7CD4-5E0E-6845-96C9-0DFA878C3CDA}" dt="2023-05-23T10:34:46.119" v="1121" actId="1076"/>
+          <ac:chgData name="Catherine Kidner" userId="05772faa-c547-42bd-a4f8-01ff9d39ffcc" providerId="ADAL" clId="{A45D7CD4-5E0E-6845-96C9-0DFA878C3CDA}" dt="2023-06-01T14:26:25.204" v="1426" actId="403"/>
           <ac:spMkLst>
             <pc:docMk/>
             <pc:sldMk cId="2424707560" sldId="266"/>
@@ -999,7 +1015,7 @@
           <a:p>
             <a:fld id="{6FD9776F-9BA3-C446-BC76-1E7B0EDEC55C}" type="datetimeFigureOut">
               <a:rPr lang="en-US" smtClean="0"/>
-              <a:t>5/23/23</a:t>
+              <a:t>6/5/23</a:t>
             </a:fld>
             <a:endParaRPr lang="en-US"/>
           </a:p>
@@ -1199,7 +1215,7 @@
           <a:p>
             <a:fld id="{6FD9776F-9BA3-C446-BC76-1E7B0EDEC55C}" type="datetimeFigureOut">
               <a:rPr lang="en-US" smtClean="0"/>
-              <a:t>5/23/23</a:t>
+              <a:t>6/5/23</a:t>
             </a:fld>
             <a:endParaRPr lang="en-US"/>
           </a:p>
@@ -1409,7 +1425,7 @@
           <a:p>
             <a:fld id="{6FD9776F-9BA3-C446-BC76-1E7B0EDEC55C}" type="datetimeFigureOut">
               <a:rPr lang="en-US" smtClean="0"/>
-              <a:t>5/23/23</a:t>
+              <a:t>6/5/23</a:t>
             </a:fld>
             <a:endParaRPr lang="en-US"/>
           </a:p>
@@ -1609,7 +1625,7 @@
           <a:p>
             <a:fld id="{6FD9776F-9BA3-C446-BC76-1E7B0EDEC55C}" type="datetimeFigureOut">
               <a:rPr lang="en-US" smtClean="0"/>
-              <a:t>5/23/23</a:t>
+              <a:t>6/5/23</a:t>
             </a:fld>
             <a:endParaRPr lang="en-US"/>
           </a:p>
@@ -1885,7 +1901,7 @@
           <a:p>
             <a:fld id="{6FD9776F-9BA3-C446-BC76-1E7B0EDEC55C}" type="datetimeFigureOut">
               <a:rPr lang="en-US" smtClean="0"/>
-              <a:t>5/23/23</a:t>
+              <a:t>6/5/23</a:t>
             </a:fld>
             <a:endParaRPr lang="en-US"/>
           </a:p>
@@ -2153,7 +2169,7 @@
           <a:p>
             <a:fld id="{6FD9776F-9BA3-C446-BC76-1E7B0EDEC55C}" type="datetimeFigureOut">
               <a:rPr lang="en-US" smtClean="0"/>
-              <a:t>5/23/23</a:t>
+              <a:t>6/5/23</a:t>
             </a:fld>
             <a:endParaRPr lang="en-US"/>
           </a:p>
@@ -2568,7 +2584,7 @@
           <a:p>
             <a:fld id="{6FD9776F-9BA3-C446-BC76-1E7B0EDEC55C}" type="datetimeFigureOut">
               <a:rPr lang="en-US" smtClean="0"/>
-              <a:t>5/23/23</a:t>
+              <a:t>6/5/23</a:t>
             </a:fld>
             <a:endParaRPr lang="en-US"/>
           </a:p>
@@ -2710,7 +2726,7 @@
           <a:p>
             <a:fld id="{6FD9776F-9BA3-C446-BC76-1E7B0EDEC55C}" type="datetimeFigureOut">
               <a:rPr lang="en-US" smtClean="0"/>
-              <a:t>5/23/23</a:t>
+              <a:t>6/5/23</a:t>
             </a:fld>
             <a:endParaRPr lang="en-US"/>
           </a:p>
@@ -2823,7 +2839,7 @@
           <a:p>
             <a:fld id="{6FD9776F-9BA3-C446-BC76-1E7B0EDEC55C}" type="datetimeFigureOut">
               <a:rPr lang="en-US" smtClean="0"/>
-              <a:t>5/23/23</a:t>
+              <a:t>6/5/23</a:t>
             </a:fld>
             <a:endParaRPr lang="en-US"/>
           </a:p>
@@ -3136,7 +3152,7 @@
           <a:p>
             <a:fld id="{6FD9776F-9BA3-C446-BC76-1E7B0EDEC55C}" type="datetimeFigureOut">
               <a:rPr lang="en-US" smtClean="0"/>
-              <a:t>5/23/23</a:t>
+              <a:t>6/5/23</a:t>
             </a:fld>
             <a:endParaRPr lang="en-US"/>
           </a:p>
@@ -3425,7 +3441,7 @@
           <a:p>
             <a:fld id="{6FD9776F-9BA3-C446-BC76-1E7B0EDEC55C}" type="datetimeFigureOut">
               <a:rPr lang="en-US" smtClean="0"/>
-              <a:t>5/23/23</a:t>
+              <a:t>6/5/23</a:t>
             </a:fld>
             <a:endParaRPr lang="en-US"/>
           </a:p>
@@ -3668,7 +3684,7 @@
           <a:p>
             <a:fld id="{6FD9776F-9BA3-C446-BC76-1E7B0EDEC55C}" type="datetimeFigureOut">
               <a:rPr lang="en-US" smtClean="0"/>
-              <a:t>5/23/23</a:t>
+              <a:t>6/5/23</a:t>
             </a:fld>
             <a:endParaRPr lang="en-US"/>
           </a:p>
@@ -4334,7 +4350,7 @@
           <p:cNvPr id="4" name="TextBox 3">
             <a:extLst>
               <a:ext uri="{FF2B5EF4-FFF2-40B4-BE49-F238E27FC236}">
-                <a16:creationId xmlns:a16="http://schemas.microsoft.com/office/drawing/2014/main" id="{1B1A57DA-C0F7-FE1C-DFE1-6EBA6907C139}"/>
+                <a16:creationId xmlns:a16="http://schemas.microsoft.com/office/drawing/2014/main" id="{E844B058-FDF3-5C3F-6D37-117B4364C6CA}"/>
               </a:ext>
             </a:extLst>
           </p:cNvPr>
@@ -4343,8 +4359,8 @@
         </p:nvSpPr>
         <p:spPr>
           <a:xfrm>
-            <a:off x="707694" y="620486"/>
-            <a:ext cx="1419556" cy="523220"/>
+            <a:off x="707571" y="657761"/>
+            <a:ext cx="5595763" cy="523220"/>
           </a:xfrm>
           <a:prstGeom prst="rect">
             <a:avLst/>
@@ -4359,7 +4375,11 @@
           <a:p>
             <a:r>
               <a:rPr lang="en-US" sz="2800" b="1" dirty="0"/>
-              <a:t>Splitting</a:t>
+              <a:t>Casting </a:t>
+            </a:r>
+            <a:r>
+              <a:rPr lang="en-US" sz="2400" dirty="0"/>
+              <a:t>(Opposite of melting) – use pivot</a:t>
             </a:r>
           </a:p>
         </p:txBody>
@@ -4369,7 +4389,7 @@
           <p:cNvPr id="6" name="Picture 5">
             <a:extLst>
               <a:ext uri="{FF2B5EF4-FFF2-40B4-BE49-F238E27FC236}">
-                <a16:creationId xmlns:a16="http://schemas.microsoft.com/office/drawing/2014/main" id="{8FF18725-6E7D-DD6B-DAE7-12507D4C5A81}"/>
+                <a16:creationId xmlns:a16="http://schemas.microsoft.com/office/drawing/2014/main" id="{6163CD30-D104-B449-24CF-0A8BF9808DF6}"/>
               </a:ext>
             </a:extLst>
           </p:cNvPr>
@@ -4386,8 +4406,8 @@
         </p:blipFill>
         <p:spPr>
           <a:xfrm>
-            <a:off x="1844221" y="1143706"/>
-            <a:ext cx="7772400" cy="4930034"/>
+            <a:off x="1727200" y="1834438"/>
+            <a:ext cx="8688170" cy="3564876"/>
           </a:xfrm>
           <a:prstGeom prst="rect">
             <a:avLst/>
@@ -4399,7 +4419,7 @@
           <p:cNvPr id="8" name="TextBox 7">
             <a:extLst>
               <a:ext uri="{FF2B5EF4-FFF2-40B4-BE49-F238E27FC236}">
-                <a16:creationId xmlns:a16="http://schemas.microsoft.com/office/drawing/2014/main" id="{8A313887-7049-1FB9-6324-4319E27489BA}"/>
+                <a16:creationId xmlns:a16="http://schemas.microsoft.com/office/drawing/2014/main" id="{076ADEE6-D273-6F39-D488-724A87F343D1}"/>
               </a:ext>
             </a:extLst>
           </p:cNvPr>
@@ -4408,8 +4428,8 @@
         </p:nvSpPr>
         <p:spPr>
           <a:xfrm>
-            <a:off x="329878" y="6073740"/>
-            <a:ext cx="6099858" cy="369332"/>
+            <a:off x="598279" y="5498773"/>
+            <a:ext cx="6096000" cy="369332"/>
           </a:xfrm>
           <a:prstGeom prst="rect">
             <a:avLst/>
@@ -4423,12 +4443,76 @@
           <a:lstStyle/>
           <a:p>
             <a:r>
+              <a:rPr lang="en-GB" b="0" i="0" dirty="0" err="1">
+                <a:solidFill>
+                  <a:srgbClr val="FF0000"/>
+                </a:solidFill>
+                <a:effectLst/>
+                <a:latin typeface="source-code-pro"/>
+              </a:rPr>
+              <a:t>df.pivot</a:t>
+            </a:r>
+            <a:r>
+              <a:rPr lang="en-GB" b="0" i="0" dirty="0">
+                <a:solidFill>
+                  <a:srgbClr val="FF0000"/>
+                </a:solidFill>
+                <a:effectLst/>
+                <a:latin typeface="source-code-pro"/>
+              </a:rPr>
+              <a:t>() </a:t>
+            </a:r>
+            <a:endParaRPr lang="en-US" dirty="0">
+              <a:solidFill>
+                <a:srgbClr val="FF0000"/>
+              </a:solidFill>
+            </a:endParaRPr>
+          </a:p>
+        </p:txBody>
+      </p:sp>
+      <p:sp>
+        <p:nvSpPr>
+          <p:cNvPr id="3" name="TextBox 2">
+            <a:extLst>
+              <a:ext uri="{FF2B5EF4-FFF2-40B4-BE49-F238E27FC236}">
+                <a16:creationId xmlns:a16="http://schemas.microsoft.com/office/drawing/2014/main" id="{83A77B87-7DC5-3175-2ABA-C484B5DB88A3}"/>
+              </a:ext>
+            </a:extLst>
+          </p:cNvPr>
+          <p:cNvSpPr txBox="1"/>
+          <p:nvPr/>
+        </p:nvSpPr>
+        <p:spPr>
+          <a:xfrm>
+            <a:off x="707571" y="5967564"/>
+            <a:ext cx="10314432" cy="369332"/>
+          </a:xfrm>
+          <a:prstGeom prst="rect">
+            <a:avLst/>
+          </a:prstGeom>
+          <a:noFill/>
+        </p:spPr>
+        <p:txBody>
+          <a:bodyPr wrap="square">
+            <a:spAutoFit/>
+          </a:bodyPr>
+          <a:lstStyle/>
+          <a:p>
+            <a:r>
+              <a:rPr lang="en-GB" dirty="0">
+                <a:solidFill>
+                  <a:srgbClr val="FF0000"/>
+                </a:solidFill>
+              </a:rPr>
+              <a:t>df2 = </a:t>
+            </a:r>
+            <a:r>
               <a:rPr lang="en-GB" dirty="0" err="1">
                 <a:solidFill>
                   <a:srgbClr val="FF0000"/>
                 </a:solidFill>
               </a:rPr>
-              <a:t>Series.str.split</a:t>
+              <a:t>pd.pivot</a:t>
             </a:r>
             <a:r>
               <a:rPr lang="en-GB" dirty="0">
@@ -4436,17 +4520,108 @@
                   <a:srgbClr val="FF0000"/>
                 </a:solidFill>
               </a:rPr>
-              <a:t>()</a:t>
-            </a:r>
-            <a:r>
-              <a:rPr lang="en-GB" b="0" i="0" dirty="0">
+              <a:t>(</a:t>
+            </a:r>
+            <a:r>
+              <a:rPr lang="en-GB" dirty="0" err="1">
+                <a:solidFill>
+                  <a:srgbClr val="FF0000"/>
+                </a:solidFill>
+              </a:rPr>
+              <a:t>df</a:t>
+            </a:r>
+            <a:r>
+              <a:rPr lang="en-GB" dirty="0">
+                <a:solidFill>
+                  <a:srgbClr val="FF0000"/>
+                </a:solidFill>
+              </a:rPr>
+              <a:t>, </a:t>
+            </a:r>
+            <a:r>
+              <a:rPr lang="en-GB" dirty="0">
                 <a:solidFill>
                   <a:srgbClr val="FF0000"/>
                 </a:solidFill>
                 <a:effectLst/>
-                <a:latin typeface="Open Sans" panose="020B0606030504020204" pitchFamily="34" charset="0"/>
               </a:rPr>
-              <a:t> </a:t>
+              <a:t>index</a:t>
+            </a:r>
+            <a:r>
+              <a:rPr lang="en-GB" dirty="0">
+                <a:solidFill>
+                  <a:srgbClr val="FF0000"/>
+                </a:solidFill>
+              </a:rPr>
+              <a:t>=</a:t>
+            </a:r>
+            <a:r>
+              <a:rPr lang="en-GB" dirty="0">
+                <a:solidFill>
+                  <a:srgbClr val="FF0000"/>
+                </a:solidFill>
+                <a:effectLst/>
+              </a:rPr>
+              <a:t>[‘id’, ‘date’]</a:t>
+            </a:r>
+            <a:r>
+              <a:rPr lang="en-GB" dirty="0">
+                <a:solidFill>
+                  <a:srgbClr val="FF0000"/>
+                </a:solidFill>
+              </a:rPr>
+              <a:t>, columns=</a:t>
+            </a:r>
+            <a:r>
+              <a:rPr lang="en-GB" dirty="0">
+                <a:solidFill>
+                  <a:srgbClr val="FF0000"/>
+                </a:solidFill>
+                <a:effectLst/>
+              </a:rPr>
+              <a:t>‘element'</a:t>
+            </a:r>
+            <a:r>
+              <a:rPr lang="en-GB" dirty="0">
+                <a:solidFill>
+                  <a:srgbClr val="FF0000"/>
+                </a:solidFill>
+              </a:rPr>
+              <a:t>, </a:t>
+            </a:r>
+            <a:r>
+              <a:rPr lang="en-GB" dirty="0">
+                <a:solidFill>
+                  <a:srgbClr val="FF0000"/>
+                </a:solidFill>
+                <a:effectLst/>
+              </a:rPr>
+              <a:t>values</a:t>
+            </a:r>
+            <a:r>
+              <a:rPr lang="en-GB" dirty="0">
+                <a:solidFill>
+                  <a:srgbClr val="FF0000"/>
+                </a:solidFill>
+              </a:rPr>
+              <a:t>=</a:t>
+            </a:r>
+            <a:r>
+              <a:rPr lang="en-GB" dirty="0">
+                <a:solidFill>
+                  <a:srgbClr val="FF0000"/>
+                </a:solidFill>
+                <a:effectLst/>
+              </a:rPr>
+              <a:t>‘value'</a:t>
+            </a:r>
+            <a:r>
+              <a:rPr lang="en-GB" dirty="0">
+                <a:solidFill>
+                  <a:srgbClr val="FF0000"/>
+                </a:solidFill>
+              </a:rPr>
+              <a:t>)</a:t>
             </a:r>
             <a:endParaRPr lang="en-US" dirty="0">
               <a:solidFill>
@@ -4459,7 +4634,7 @@
     </p:spTree>
     <p:extLst>
       <p:ext uri="{BB962C8B-B14F-4D97-AF65-F5344CB8AC3E}">
-        <p14:creationId xmlns:p14="http://schemas.microsoft.com/office/powerpoint/2010/main" val="898206973"/>
+        <p14:creationId xmlns:p14="http://schemas.microsoft.com/office/powerpoint/2010/main" val="261170781"/>
       </p:ext>
     </p:extLst>
   </p:cSld>
@@ -5676,8 +5851,8 @@
         </p:nvSpPr>
         <p:spPr>
           <a:xfrm>
-            <a:off x="2145981" y="1536174"/>
-            <a:ext cx="9071185" cy="3785652"/>
+            <a:off x="2145980" y="982176"/>
+            <a:ext cx="9071185" cy="4893647"/>
           </a:xfrm>
           <a:prstGeom prst="rect">
             <a:avLst/>
@@ -5692,6 +5867,33 @@
           <a:p>
             <a:r>
               <a:rPr lang="en-GB" sz="2400" b="1" dirty="0"/>
+              <a:t>Transform</a:t>
+            </a:r>
+            <a:r>
+              <a:rPr lang="en-GB" sz="2400" dirty="0"/>
+              <a:t>: adding or modifying variables. These modifications can involve either a single variable (e.g., log-transformation), or multiple variables (e.g., computing density from weight and volume). </a:t>
+            </a:r>
+          </a:p>
+          <a:p>
+            <a:endParaRPr lang="en-GB" sz="2400" b="1" dirty="0"/>
+          </a:p>
+          <a:p>
+            <a:r>
+              <a:rPr lang="en-GB" sz="2400" b="1" dirty="0"/>
+              <a:t>Sort</a:t>
+            </a:r>
+            <a:r>
+              <a:rPr lang="en-GB" sz="2400" dirty="0"/>
+              <a:t>: changing the order of observations</a:t>
+            </a:r>
+            <a:endParaRPr lang="en-GB" sz="2400" b="1" dirty="0"/>
+          </a:p>
+          <a:p>
+            <a:endParaRPr lang="en-GB" sz="2400" b="1" dirty="0"/>
+          </a:p>
+          <a:p>
+            <a:r>
+              <a:rPr lang="en-GB" sz="2400" b="1" dirty="0"/>
               <a:t>Filter</a:t>
             </a:r>
             <a:r>
@@ -5708,20 +5910,13 @@
             </a:r>
           </a:p>
           <a:p>
-            <a:endParaRPr lang="en-GB" sz="2400" dirty="0"/>
-          </a:p>
-          <a:p>
-            <a:r>
-              <a:rPr lang="en-GB" sz="2400" b="1" dirty="0"/>
-              <a:t>Transform</a:t>
-            </a:r>
-            <a:r>
-              <a:rPr lang="en-GB" sz="2400" dirty="0"/>
-              <a:t>: adding or modifying variables. These modifications can involve either a single variable (e.g., log-transformation), or multiple variables (e.g., computing density from weight and volume). </a:t>
-            </a:r>
-          </a:p>
-          <a:p>
-            <a:endParaRPr lang="en-GB" sz="2400" dirty="0"/>
+            <a:r>
+              <a:rPr lang="en-GB" sz="2400" i="1" dirty="0"/>
+              <a:t>(week 5)</a:t>
+            </a:r>
+          </a:p>
+          <a:p>
+            <a:endParaRPr lang="en-GB" sz="2400" i="1" dirty="0"/>
           </a:p>
           <a:p>
             <a:r>
@@ -5734,18 +5929,13 @@
             </a:r>
           </a:p>
           <a:p>
+            <a:r>
+              <a:rPr lang="en-GB" sz="2400" i="1" dirty="0"/>
+              <a:t>(week 5)</a:t>
+            </a:r>
+          </a:p>
+          <a:p>
             <a:endParaRPr lang="en-GB" sz="2400" dirty="0"/>
-          </a:p>
-          <a:p>
-            <a:r>
-              <a:rPr lang="en-GB" sz="2400" b="1" dirty="0"/>
-              <a:t>Sort</a:t>
-            </a:r>
-            <a:r>
-              <a:rPr lang="en-GB" sz="2400" dirty="0"/>
-              <a:t>: changing the order of observations</a:t>
-            </a:r>
-            <a:endParaRPr lang="en-US" sz="2400" dirty="0"/>
           </a:p>
         </p:txBody>
       </p:sp>
@@ -5763,7 +5953,7 @@
         </p:nvSpPr>
         <p:spPr>
           <a:xfrm>
-            <a:off x="1328057" y="685800"/>
+            <a:off x="1328056" y="270301"/>
             <a:ext cx="5353517" cy="461665"/>
           </a:xfrm>
           <a:prstGeom prst="rect">
@@ -5799,7 +5989,7 @@
         <p:spPr>
           <a:xfrm>
             <a:off x="1328057" y="5987534"/>
-            <a:ext cx="7025833" cy="369332"/>
+            <a:ext cx="7025833" cy="461665"/>
           </a:xfrm>
           <a:prstGeom prst="rect">
             <a:avLst/>
@@ -5813,7 +6003,7 @@
           <a:lstStyle/>
           <a:p>
             <a:r>
-              <a:rPr lang="en-US" dirty="0"/>
+              <a:rPr lang="en-US" sz="2400" dirty="0"/>
               <a:t>Tidy data (usually) makes all these operation easier</a:t>
             </a:r>
           </a:p>
@@ -5854,7 +6044,7 @@
           <p:cNvPr id="4" name="TextBox 3">
             <a:extLst>
               <a:ext uri="{FF2B5EF4-FFF2-40B4-BE49-F238E27FC236}">
-                <a16:creationId xmlns:a16="http://schemas.microsoft.com/office/drawing/2014/main" id="{52077BE6-AEB0-7401-22D9-31A3F8D3C18A}"/>
+                <a16:creationId xmlns:a16="http://schemas.microsoft.com/office/drawing/2014/main" id="{1B1A57DA-C0F7-FE1C-DFE1-6EBA6907C139}"/>
               </a:ext>
             </a:extLst>
           </p:cNvPr>
@@ -5863,8 +6053,8 @@
         </p:nvSpPr>
         <p:spPr>
           <a:xfrm>
-            <a:off x="729343" y="446705"/>
-            <a:ext cx="1508746" cy="584775"/>
+            <a:off x="707694" y="620486"/>
+            <a:ext cx="1419556" cy="523220"/>
           </a:xfrm>
           <a:prstGeom prst="rect">
             <a:avLst/>
@@ -5878,18 +6068,18 @@
           <a:lstStyle/>
           <a:p>
             <a:r>
-              <a:rPr lang="en-US" sz="3200" b="1" dirty="0"/>
-              <a:t>Melting</a:t>
+              <a:rPr lang="en-US" sz="2800" b="1" dirty="0"/>
+              <a:t>Splitting</a:t>
             </a:r>
           </a:p>
         </p:txBody>
       </p:sp>
       <p:pic>
         <p:nvPicPr>
-          <p:cNvPr id="7" name="Picture 6">
-            <a:extLst>
-              <a:ext uri="{FF2B5EF4-FFF2-40B4-BE49-F238E27FC236}">
-                <a16:creationId xmlns:a16="http://schemas.microsoft.com/office/drawing/2014/main" id="{96BD7DC4-6387-D12D-0C3D-4A4363F0214C}"/>
+          <p:cNvPr id="6" name="Picture 5">
+            <a:extLst>
+              <a:ext uri="{FF2B5EF4-FFF2-40B4-BE49-F238E27FC236}">
+                <a16:creationId xmlns:a16="http://schemas.microsoft.com/office/drawing/2014/main" id="{8FF18725-6E7D-DD6B-DAE7-12507D4C5A81}"/>
               </a:ext>
             </a:extLst>
           </p:cNvPr>
@@ -5906,8 +6096,8 @@
         </p:blipFill>
         <p:spPr>
           <a:xfrm>
-            <a:off x="1954893" y="1424214"/>
-            <a:ext cx="6540500" cy="4445000"/>
+            <a:off x="1844221" y="1143706"/>
+            <a:ext cx="7772400" cy="4930034"/>
           </a:xfrm>
           <a:prstGeom prst="rect">
             <a:avLst/>
@@ -5919,7 +6109,7 @@
           <p:cNvPr id="8" name="TextBox 7">
             <a:extLst>
               <a:ext uri="{FF2B5EF4-FFF2-40B4-BE49-F238E27FC236}">
-                <a16:creationId xmlns:a16="http://schemas.microsoft.com/office/drawing/2014/main" id="{4A75316D-3B6C-E13B-AC1E-E06897FF1E3C}"/>
+                <a16:creationId xmlns:a16="http://schemas.microsoft.com/office/drawing/2014/main" id="{8A313887-7049-1FB9-6324-4319E27489BA}"/>
               </a:ext>
             </a:extLst>
           </p:cNvPr>
@@ -5928,8 +6118,8 @@
         </p:nvSpPr>
         <p:spPr>
           <a:xfrm>
-            <a:off x="1023257" y="5869214"/>
-            <a:ext cx="849015" cy="369332"/>
+            <a:off x="329878" y="6073740"/>
+            <a:ext cx="6099858" cy="369332"/>
           </a:xfrm>
           <a:prstGeom prst="rect">
             <a:avLst/>
@@ -5937,18 +6127,36 @@
           <a:noFill/>
         </p:spPr>
         <p:txBody>
-          <a:bodyPr wrap="none" rtlCol="0">
+          <a:bodyPr wrap="square">
             <a:spAutoFit/>
           </a:bodyPr>
           <a:lstStyle/>
           <a:p>
             <a:r>
-              <a:rPr lang="en-US" dirty="0" err="1">
+              <a:rPr lang="en-GB" dirty="0" err="1">
                 <a:solidFill>
                   <a:srgbClr val="FF0000"/>
                 </a:solidFill>
               </a:rPr>
-              <a:t>df.melt</a:t>
+              <a:t>Series.str.split</a:t>
+            </a:r>
+            <a:r>
+              <a:rPr lang="en-GB" dirty="0">
+                <a:solidFill>
+                  <a:srgbClr val="FF0000"/>
+                </a:solidFill>
+              </a:rPr>
+              <a:t>()</a:t>
+            </a:r>
+            <a:r>
+              <a:rPr lang="en-GB" b="0" i="0" dirty="0">
+                <a:solidFill>
+                  <a:srgbClr val="FF0000"/>
+                </a:solidFill>
+                <a:effectLst/>
+                <a:latin typeface="Open Sans" panose="020B0606030504020204" pitchFamily="34" charset="0"/>
+              </a:rPr>
+              <a:t> </a:t>
             </a:r>
             <a:endParaRPr lang="en-US" dirty="0">
               <a:solidFill>
@@ -5961,7 +6169,7 @@
     </p:spTree>
     <p:extLst>
       <p:ext uri="{BB962C8B-B14F-4D97-AF65-F5344CB8AC3E}">
-        <p14:creationId xmlns:p14="http://schemas.microsoft.com/office/powerpoint/2010/main" val="4172342904"/>
+        <p14:creationId xmlns:p14="http://schemas.microsoft.com/office/powerpoint/2010/main" val="898206973"/>
       </p:ext>
     </p:extLst>
   </p:cSld>
@@ -5993,7 +6201,7 @@
           <p:cNvPr id="4" name="TextBox 3">
             <a:extLst>
               <a:ext uri="{FF2B5EF4-FFF2-40B4-BE49-F238E27FC236}">
-                <a16:creationId xmlns:a16="http://schemas.microsoft.com/office/drawing/2014/main" id="{E844B058-FDF3-5C3F-6D37-117B4364C6CA}"/>
+                <a16:creationId xmlns:a16="http://schemas.microsoft.com/office/drawing/2014/main" id="{52077BE6-AEB0-7401-22D9-31A3F8D3C18A}"/>
               </a:ext>
             </a:extLst>
           </p:cNvPr>
@@ -6002,8 +6210,8 @@
         </p:nvSpPr>
         <p:spPr>
           <a:xfrm>
-            <a:off x="707571" y="657761"/>
-            <a:ext cx="2847126" cy="892552"/>
+            <a:off x="729343" y="446705"/>
+            <a:ext cx="1508746" cy="584775"/>
           </a:xfrm>
           <a:prstGeom prst="rect">
             <a:avLst/>
@@ -6017,24 +6225,18 @@
           <a:lstStyle/>
           <a:p>
             <a:r>
-              <a:rPr lang="en-US" sz="2800" b="1" dirty="0"/>
-              <a:t>Casting</a:t>
-            </a:r>
-          </a:p>
-          <a:p>
-            <a:r>
-              <a:rPr lang="en-US" sz="2400" dirty="0"/>
-              <a:t>(Opposite of melting)</a:t>
+              <a:rPr lang="en-US" sz="3200" b="1" dirty="0"/>
+              <a:t>Melting</a:t>
             </a:r>
           </a:p>
         </p:txBody>
       </p:sp>
       <p:pic>
         <p:nvPicPr>
-          <p:cNvPr id="6" name="Picture 5">
-            <a:extLst>
-              <a:ext uri="{FF2B5EF4-FFF2-40B4-BE49-F238E27FC236}">
-                <a16:creationId xmlns:a16="http://schemas.microsoft.com/office/drawing/2014/main" id="{6163CD30-D104-B449-24CF-0A8BF9808DF6}"/>
+          <p:cNvPr id="7" name="Picture 6">
+            <a:extLst>
+              <a:ext uri="{FF2B5EF4-FFF2-40B4-BE49-F238E27FC236}">
+                <a16:creationId xmlns:a16="http://schemas.microsoft.com/office/drawing/2014/main" id="{96BD7DC4-6387-D12D-0C3D-4A4363F0214C}"/>
               </a:ext>
             </a:extLst>
           </p:cNvPr>
@@ -6051,8 +6253,8 @@
         </p:blipFill>
         <p:spPr>
           <a:xfrm>
-            <a:off x="1727200" y="1834438"/>
-            <a:ext cx="8688170" cy="3564876"/>
+            <a:off x="1954893" y="1424214"/>
+            <a:ext cx="6540500" cy="4445000"/>
           </a:xfrm>
           <a:prstGeom prst="rect">
             <a:avLst/>
@@ -6064,7 +6266,7 @@
           <p:cNvPr id="8" name="TextBox 7">
             <a:extLst>
               <a:ext uri="{FF2B5EF4-FFF2-40B4-BE49-F238E27FC236}">
-                <a16:creationId xmlns:a16="http://schemas.microsoft.com/office/drawing/2014/main" id="{076ADEE6-D273-6F39-D488-724A87F343D1}"/>
+                <a16:creationId xmlns:a16="http://schemas.microsoft.com/office/drawing/2014/main" id="{4A75316D-3B6C-E13B-AC1E-E06897FF1E3C}"/>
               </a:ext>
             </a:extLst>
           </p:cNvPr>
@@ -6073,8 +6275,8 @@
         </p:nvSpPr>
         <p:spPr>
           <a:xfrm>
-            <a:off x="1110343" y="6015573"/>
-            <a:ext cx="6096000" cy="369332"/>
+            <a:off x="729343" y="5424674"/>
+            <a:ext cx="990079" cy="369332"/>
           </a:xfrm>
           <a:prstGeom prst="rect">
             <a:avLst/>
@@ -6082,43 +6284,161 @@
           <a:noFill/>
         </p:spPr>
         <p:txBody>
+          <a:bodyPr wrap="none" rtlCol="0">
+            <a:spAutoFit/>
+          </a:bodyPr>
+          <a:lstStyle/>
+          <a:p>
+            <a:r>
+              <a:rPr lang="en-US" dirty="0" err="1">
+                <a:solidFill>
+                  <a:srgbClr val="FF0000"/>
+                </a:solidFill>
+              </a:rPr>
+              <a:t>df.melt</a:t>
+            </a:r>
+            <a:r>
+              <a:rPr lang="en-US" dirty="0">
+                <a:solidFill>
+                  <a:srgbClr val="FF0000"/>
+                </a:solidFill>
+              </a:rPr>
+              <a:t>()</a:t>
+            </a:r>
+          </a:p>
+        </p:txBody>
+      </p:sp>
+      <p:sp>
+        <p:nvSpPr>
+          <p:cNvPr id="3" name="TextBox 2">
+            <a:extLst>
+              <a:ext uri="{FF2B5EF4-FFF2-40B4-BE49-F238E27FC236}">
+                <a16:creationId xmlns:a16="http://schemas.microsoft.com/office/drawing/2014/main" id="{79BD258C-B20E-F39D-3B3F-B4CD12038FCB}"/>
+              </a:ext>
+            </a:extLst>
+          </p:cNvPr>
+          <p:cNvSpPr txBox="1"/>
+          <p:nvPr/>
+        </p:nvSpPr>
+        <p:spPr>
+          <a:xfrm>
+            <a:off x="729343" y="6088129"/>
+            <a:ext cx="10926209" cy="369332"/>
+          </a:xfrm>
+          <a:prstGeom prst="rect">
+            <a:avLst/>
+          </a:prstGeom>
+          <a:noFill/>
+        </p:spPr>
+        <p:txBody>
           <a:bodyPr wrap="square">
             <a:spAutoFit/>
           </a:bodyPr>
           <a:lstStyle/>
           <a:p>
             <a:r>
-              <a:rPr lang="en-GB" b="0" i="0" dirty="0" err="1">
+              <a:rPr lang="en-US" dirty="0" err="1">
                 <a:solidFill>
                   <a:srgbClr val="FF0000"/>
                 </a:solidFill>
-                <a:effectLst/>
-                <a:latin typeface="source-code-pro"/>
               </a:rPr>
-              <a:t>df.pivot_table</a:t>
-            </a:r>
-            <a:r>
-              <a:rPr lang="en-GB" b="0" i="0" dirty="0">
+              <a:t>pd.melt</a:t>
+            </a:r>
+            <a:r>
+              <a:rPr lang="en-US" dirty="0">
                 <a:solidFill>
                   <a:srgbClr val="FF0000"/>
                 </a:solidFill>
-                <a:effectLst/>
-                <a:latin typeface="source-code-pro"/>
               </a:rPr>
-              <a:t> </a:t>
-            </a:r>
-            <a:endParaRPr lang="en-US" dirty="0">
-              <a:solidFill>
-                <a:srgbClr val="FF0000"/>
-              </a:solidFill>
-            </a:endParaRPr>
+              <a:t>(</a:t>
+            </a:r>
+            <a:r>
+              <a:rPr lang="en-US" dirty="0" err="1">
+                <a:solidFill>
+                  <a:srgbClr val="FF0000"/>
+                </a:solidFill>
+              </a:rPr>
+              <a:t>df</a:t>
+            </a:r>
+            <a:r>
+              <a:rPr lang="en-US" dirty="0">
+                <a:solidFill>
+                  <a:srgbClr val="FF0000"/>
+                </a:solidFill>
+              </a:rPr>
+              <a:t>, </a:t>
+            </a:r>
+            <a:r>
+              <a:rPr lang="en-US" dirty="0" err="1">
+                <a:solidFill>
+                  <a:srgbClr val="FF0000"/>
+                </a:solidFill>
+              </a:rPr>
+              <a:t>id_vars</a:t>
+            </a:r>
+            <a:r>
+              <a:rPr lang="en-US" dirty="0">
+                <a:solidFill>
+                  <a:srgbClr val="FF0000"/>
+                </a:solidFill>
+              </a:rPr>
+              <a:t>=[Row'], </a:t>
+            </a:r>
+            <a:r>
+              <a:rPr lang="en-US" dirty="0" err="1">
+                <a:solidFill>
+                  <a:srgbClr val="FF0000"/>
+                </a:solidFill>
+              </a:rPr>
+              <a:t>value_vars</a:t>
+            </a:r>
+            <a:r>
+              <a:rPr lang="en-US" dirty="0">
+                <a:solidFill>
+                  <a:srgbClr val="FF0000"/>
+                </a:solidFill>
+              </a:rPr>
+              <a:t>= [‘a’, ‘b’, ‘c’], </a:t>
+            </a:r>
+            <a:r>
+              <a:rPr lang="en-US" dirty="0" err="1">
+                <a:solidFill>
+                  <a:srgbClr val="FF0000"/>
+                </a:solidFill>
+              </a:rPr>
+              <a:t>var_name</a:t>
+            </a:r>
+            <a:r>
+              <a:rPr lang="en-US" dirty="0">
+                <a:solidFill>
+                  <a:srgbClr val="FF0000"/>
+                </a:solidFill>
+              </a:rPr>
+              <a:t>=‘column', </a:t>
+            </a:r>
+            <a:r>
+              <a:rPr lang="en-US" dirty="0" err="1">
+                <a:solidFill>
+                  <a:srgbClr val="FF0000"/>
+                </a:solidFill>
+              </a:rPr>
+              <a:t>value_name</a:t>
+            </a:r>
+            <a:r>
+              <a:rPr lang="en-US" dirty="0">
+                <a:solidFill>
+                  <a:srgbClr val="FF0000"/>
+                </a:solidFill>
+              </a:rPr>
+              <a:t>=‘value')</a:t>
+            </a:r>
           </a:p>
         </p:txBody>
       </p:sp>
     </p:spTree>
     <p:extLst>
       <p:ext uri="{BB962C8B-B14F-4D97-AF65-F5344CB8AC3E}">
-        <p14:creationId xmlns:p14="http://schemas.microsoft.com/office/powerpoint/2010/main" val="261170781"/>
+        <p14:creationId xmlns:p14="http://schemas.microsoft.com/office/powerpoint/2010/main" val="4172342904"/>
       </p:ext>
     </p:extLst>
   </p:cSld>

</xml_diff>